<commit_message>
Finalizing classical -- Need Vishal Help to correct S1 evaluation
</commit_message>
<xml_diff>
--- a/arch_Schema.pptx
+++ b/arch_Schema.pptx
@@ -198,7 +198,7 @@
           <a:p>
             <a:fld id="{22C98ADE-1729-2A49-A314-F0EBCB3BA15B}" type="datetimeFigureOut">
               <a:rPr lang="en-US" smtClean="0"/>
-              <a:t>6/6/2022</a:t>
+              <a:t>11/7/2022</a:t>
             </a:fld>
             <a:endParaRPr lang="en-US"/>
           </a:p>
@@ -881,7 +881,7 @@
           <a:p>
             <a:fld id="{CD56310E-58A7-4442-A787-6EA5472CA99D}" type="datetimeFigureOut">
               <a:rPr lang="en-US" smtClean="0"/>
-              <a:t>6/6/2022</a:t>
+              <a:t>11/7/2022</a:t>
             </a:fld>
             <a:endParaRPr lang="en-US"/>
           </a:p>
@@ -1049,7 +1049,7 @@
           <a:p>
             <a:fld id="{CD56310E-58A7-4442-A787-6EA5472CA99D}" type="datetimeFigureOut">
               <a:rPr lang="en-US" smtClean="0"/>
-              <a:t>6/6/2022</a:t>
+              <a:t>11/7/2022</a:t>
             </a:fld>
             <a:endParaRPr lang="en-US"/>
           </a:p>
@@ -1227,7 +1227,7 @@
           <a:p>
             <a:fld id="{CD56310E-58A7-4442-A787-6EA5472CA99D}" type="datetimeFigureOut">
               <a:rPr lang="en-US" smtClean="0"/>
-              <a:t>6/6/2022</a:t>
+              <a:t>11/7/2022</a:t>
             </a:fld>
             <a:endParaRPr lang="en-US"/>
           </a:p>
@@ -1395,7 +1395,7 @@
           <a:p>
             <a:fld id="{CD56310E-58A7-4442-A787-6EA5472CA99D}" type="datetimeFigureOut">
               <a:rPr lang="en-US" smtClean="0"/>
-              <a:t>6/6/2022</a:t>
+              <a:t>11/7/2022</a:t>
             </a:fld>
             <a:endParaRPr lang="en-US"/>
           </a:p>
@@ -1640,7 +1640,7 @@
           <a:p>
             <a:fld id="{CD56310E-58A7-4442-A787-6EA5472CA99D}" type="datetimeFigureOut">
               <a:rPr lang="en-US" smtClean="0"/>
-              <a:t>6/6/2022</a:t>
+              <a:t>11/7/2022</a:t>
             </a:fld>
             <a:endParaRPr lang="en-US"/>
           </a:p>
@@ -1869,7 +1869,7 @@
           <a:p>
             <a:fld id="{CD56310E-58A7-4442-A787-6EA5472CA99D}" type="datetimeFigureOut">
               <a:rPr lang="en-US" smtClean="0"/>
-              <a:t>6/6/2022</a:t>
+              <a:t>11/7/2022</a:t>
             </a:fld>
             <a:endParaRPr lang="en-US"/>
           </a:p>
@@ -2233,7 +2233,7 @@
           <a:p>
             <a:fld id="{CD56310E-58A7-4442-A787-6EA5472CA99D}" type="datetimeFigureOut">
               <a:rPr lang="en-US" smtClean="0"/>
-              <a:t>6/6/2022</a:t>
+              <a:t>11/7/2022</a:t>
             </a:fld>
             <a:endParaRPr lang="en-US"/>
           </a:p>
@@ -2350,7 +2350,7 @@
           <a:p>
             <a:fld id="{CD56310E-58A7-4442-A787-6EA5472CA99D}" type="datetimeFigureOut">
               <a:rPr lang="en-US" smtClean="0"/>
-              <a:t>6/6/2022</a:t>
+              <a:t>11/7/2022</a:t>
             </a:fld>
             <a:endParaRPr lang="en-US"/>
           </a:p>
@@ -2445,7 +2445,7 @@
           <a:p>
             <a:fld id="{CD56310E-58A7-4442-A787-6EA5472CA99D}" type="datetimeFigureOut">
               <a:rPr lang="en-US" smtClean="0"/>
-              <a:t>6/6/2022</a:t>
+              <a:t>11/7/2022</a:t>
             </a:fld>
             <a:endParaRPr lang="en-US"/>
           </a:p>
@@ -2720,7 +2720,7 @@
           <a:p>
             <a:fld id="{CD56310E-58A7-4442-A787-6EA5472CA99D}" type="datetimeFigureOut">
               <a:rPr lang="en-US" smtClean="0"/>
-              <a:t>6/6/2022</a:t>
+              <a:t>11/7/2022</a:t>
             </a:fld>
             <a:endParaRPr lang="en-US"/>
           </a:p>
@@ -2972,7 +2972,7 @@
           <a:p>
             <a:fld id="{CD56310E-58A7-4442-A787-6EA5472CA99D}" type="datetimeFigureOut">
               <a:rPr lang="en-US" smtClean="0"/>
-              <a:t>6/6/2022</a:t>
+              <a:t>11/7/2022</a:t>
             </a:fld>
             <a:endParaRPr lang="en-US"/>
           </a:p>
@@ -3183,7 +3183,7 @@
           <a:p>
             <a:fld id="{CD56310E-58A7-4442-A787-6EA5472CA99D}" type="datetimeFigureOut">
               <a:rPr lang="en-US" smtClean="0"/>
-              <a:t>6/6/2022</a:t>
+              <a:t>11/7/2022</a:t>
             </a:fld>
             <a:endParaRPr lang="en-US"/>
           </a:p>
@@ -3940,7 +3940,7 @@
               <a:rPr lang="en-US" sz="1600" dirty="0">
                 <a:cs typeface="Times New Roman" panose="02020603050405020304" pitchFamily="18" charset="0"/>
               </a:rPr>
-              <a:t>(#S1Plans* &lt; </a:t>
+              <a:t>(#S1Plans &lt; </a:t>
             </a:r>
             <a:r>
               <a:rPr lang="en-US" sz="1600" dirty="0">
@@ -3981,7 +3981,7 @@
               <a:rPr lang="en-US" sz="1600" dirty="0">
                 <a:cs typeface="Times New Roman" panose="02020603050405020304" pitchFamily="18" charset="0"/>
               </a:rPr>
-              <a:t>{M = 1-avgCorrS1° -- </a:t>
+              <a:t>{M = 1-avgCorrS1 -- </a:t>
             </a:r>
             <a:r>
               <a:rPr lang="en-US" sz="1200" dirty="0">
@@ -4001,7 +4001,7 @@
               <a:rPr lang="en-US" sz="1100" dirty="0">
                 <a:cs typeface="Times New Roman" panose="02020603050405020304" pitchFamily="18" charset="0"/>
               </a:rPr>
-              <a:t>*#S1Plans = OK Plans found by S1</a:t>
+              <a:t>#S1Plans = OK Plans found by S1</a:t>
             </a:r>
           </a:p>
           <a:p>
@@ -4009,7 +4009,7 @@
               <a:rPr lang="en-US" sz="1100" dirty="0">
                 <a:cs typeface="Times New Roman" panose="02020603050405020304" pitchFamily="18" charset="0"/>
               </a:rPr>
-              <a:t>°avgCorrS1 = The average correctness (subgoals/</a:t>
+              <a:t>avgCorrS1 = The average correctness (subgoals/</a:t>
             </a:r>
             <a:r>
               <a:rPr lang="en-US" sz="1100" dirty="0" err="1">
@@ -4127,7 +4127,7 @@
         <p:spPr>
           <a:xfrm>
             <a:off x="6096000" y="500512"/>
-            <a:ext cx="3666901" cy="584775"/>
+            <a:ext cx="6033318" cy="584775"/>
           </a:xfrm>
           <a:prstGeom prst="rect">
             <a:avLst/>
@@ -4157,7 +4157,7 @@
                 </a:solidFill>
                 <a:cs typeface="Times New Roman" panose="02020603050405020304" pitchFamily="18" charset="0"/>
               </a:rPr>
-              <a:t>threshold_3</a:t>
+              <a:t>thresholds (1,2,3), minimum correctness</a:t>
             </a:r>
             <a:r>
               <a:rPr lang="en-US" sz="1600" dirty="0">
@@ -4257,58 +4257,124 @@
           <a:lstStyle/>
           <a:p>
             <a:r>
-              <a:rPr lang="en-US" sz="1400" b="1" dirty="0">
-                <a:cs typeface="Times New Roman" panose="02020603050405020304" pitchFamily="18" charset="0"/>
-              </a:rPr>
-              <a:t>If  </a:t>
-            </a:r>
-            <a:r>
-              <a:rPr lang="en-US" sz="1400" dirty="0">
-                <a:cs typeface="Times New Roman" panose="02020603050405020304" pitchFamily="18" charset="0"/>
-              </a:rPr>
-              <a:t>(</a:t>
-            </a:r>
-            <a:r>
-              <a:rPr lang="en-US" sz="1400" i="1" dirty="0">
-                <a:cs typeface="Times New Roman" panose="02020603050405020304" pitchFamily="18" charset="0"/>
-              </a:rPr>
-              <a:t>r</a:t>
+              <a:rPr lang="it-IT" sz="1400" dirty="0"/>
+              <a:t>ExpCostS2 = ExpTimeS2 / </a:t>
             </a:r>
             <a:r>
               <a:rPr lang="it-IT" sz="1400" i="1" dirty="0" err="1"/>
-              <a:t>emaining_time</a:t>
-            </a:r>
-            <a:r>
-              <a:rPr lang="it-IT" sz="1400" i="1" dirty="0"/>
-              <a:t> – (</a:t>
-            </a:r>
-            <a:r>
-              <a:rPr lang="it-IT" sz="1400" i="1" dirty="0" err="1"/>
-              <a:t>estimation</a:t>
-            </a:r>
-            <a:r>
-              <a:rPr lang="it-IT" sz="1400" i="1" dirty="0"/>
-              <a:t> time) </a:t>
+              <a:t>remaining_time</a:t>
+            </a:r>
+            <a:endParaRPr lang="it-IT" sz="1400" dirty="0"/>
+          </a:p>
+          <a:p>
+            <a:pPr marL="0" lvl="1"/>
+            <a:r>
+              <a:rPr lang="it-IT" sz="1400" b="1" dirty="0" err="1"/>
+              <a:t>If</a:t>
             </a:r>
             <a:r>
               <a:rPr lang="it-IT" sz="1400" dirty="0"/>
-              <a:t>&gt; 0) </a:t>
+              <a:t> (ExpCostS2 &gt; 1) </a:t>
             </a:r>
             <a:r>
               <a:rPr lang="it-IT" sz="1400" b="1" dirty="0" err="1"/>
               <a:t>Then</a:t>
             </a:r>
+            <a:endParaRPr lang="it-IT" sz="1400" b="1" dirty="0"/>
+          </a:p>
+          <a:p>
+            <a:pPr marL="0" lvl="1"/>
+            <a:r>
+              <a:rPr lang="it-IT" sz="1400" b="1" dirty="0"/>
+              <a:t>Else </a:t>
+            </a:r>
+            <a:r>
+              <a:rPr lang="en-US" sz="1400" dirty="0"/>
+              <a:t>{					</a:t>
+            </a:r>
+            <a:r>
+              <a:rPr lang="it-IT" sz="1400" dirty="0">
+                <a:solidFill>
+                  <a:schemeClr val="accent1"/>
+                </a:solidFill>
+              </a:rPr>
+              <a:t>(I </a:t>
+            </a:r>
+            <a:r>
+              <a:rPr lang="it-IT" sz="1400" dirty="0" err="1">
+                <a:solidFill>
+                  <a:schemeClr val="accent1"/>
+                </a:solidFill>
+              </a:rPr>
+              <a:t>have</a:t>
+            </a:r>
+            <a:r>
+              <a:rPr lang="it-IT" sz="1400" dirty="0">
+                <a:solidFill>
+                  <a:schemeClr val="accent1"/>
+                </a:solidFill>
+              </a:rPr>
+              <a:t> </a:t>
+            </a:r>
+            <a:r>
+              <a:rPr lang="it-IT" sz="1400" dirty="0" err="1">
+                <a:solidFill>
+                  <a:schemeClr val="accent1"/>
+                </a:solidFill>
+              </a:rPr>
+              <a:t>enough</a:t>
+            </a:r>
+            <a:r>
+              <a:rPr lang="it-IT" sz="1400" dirty="0">
+                <a:solidFill>
+                  <a:schemeClr val="accent1"/>
+                </a:solidFill>
+              </a:rPr>
+              <a:t> time to </a:t>
+            </a:r>
+            <a:r>
+              <a:rPr lang="it-IT" sz="1400" dirty="0" err="1">
+                <a:solidFill>
+                  <a:schemeClr val="accent1"/>
+                </a:solidFill>
+              </a:rPr>
+              <a:t>run</a:t>
+            </a:r>
+            <a:r>
+              <a:rPr lang="it-IT" sz="1400" dirty="0">
+                <a:solidFill>
+                  <a:schemeClr val="accent1"/>
+                </a:solidFill>
+              </a:rPr>
+              <a:t> S2)</a:t>
+            </a:r>
+            <a:r>
+              <a:rPr lang="en-US" sz="1400" dirty="0">
+                <a:solidFill>
+                  <a:schemeClr val="accent1"/>
+                </a:solidFill>
+              </a:rPr>
+              <a:t> </a:t>
+            </a:r>
+            <a:endParaRPr lang="it-IT" sz="1400" b="1" dirty="0"/>
+          </a:p>
+          <a:p>
+            <a:pPr lvl="1"/>
+            <a:r>
+              <a:rPr lang="en-US" sz="1400" dirty="0"/>
+              <a:t>with</a:t>
+            </a:r>
             <a:r>
               <a:rPr lang="it-IT" sz="1400" dirty="0"/>
-              <a:t> {ExpCostS2 = ExpTimeS2 / </a:t>
-            </a:r>
-            <a:r>
-              <a:rPr lang="it-IT" sz="1400" i="1" dirty="0" err="1"/>
-              <a:t>remaining_time</a:t>
-            </a:r>
-            <a:r>
-              <a:rPr lang="it-IT" sz="1400" dirty="0"/>
-              <a:t>}</a:t>
+              <a:t> p_s1= (1 - </a:t>
+            </a:r>
+            <a:r>
+              <a:rPr lang="it-IT" sz="1400" dirty="0" err="1">
+                <a:solidFill>
+                  <a:srgbClr val="FF0000"/>
+                </a:solidFill>
+              </a:rPr>
+              <a:t>thresh</a:t>
             </a:r>
             <a:r>
               <a:rPr lang="it-IT" sz="1400" dirty="0">
@@ -4316,14 +4382,15 @@
                   <a:srgbClr val="FF0000"/>
                 </a:solidFill>
               </a:rPr>
-              <a:t>  (default 0.3 s) </a:t>
-            </a:r>
-            <a:endParaRPr lang="it-IT" sz="1400" dirty="0"/>
-          </a:p>
-          <a:p>
-            <a:r>
-              <a:rPr lang="it-IT" sz="1400" b="1" dirty="0"/>
-              <a:t>Else</a:t>
+              <a:t> 3)*epsilon  -- </a:t>
+            </a:r>
+            <a:r>
+              <a:rPr lang="it-IT" sz="1400" dirty="0" err="1">
+                <a:solidFill>
+                  <a:srgbClr val="FF0000"/>
+                </a:solidFill>
+              </a:rPr>
+              <a:t>Randomly</a:t>
             </a:r>
             <a:r>
               <a:rPr lang="it-IT" sz="1400" dirty="0">
@@ -4334,131 +4401,12 @@
               <a:t> </a:t>
             </a:r>
             <a:r>
-              <a:rPr lang="it-IT" sz="1400" dirty="0"/>
-              <a:t>{Expected_cost_S2  = +INF}</a:t>
-            </a:r>
-            <a:endParaRPr lang="en-US" sz="1400" dirty="0">
-              <a:solidFill>
-                <a:srgbClr val="FF0000"/>
-              </a:solidFill>
-            </a:endParaRPr>
-          </a:p>
-          <a:p>
-            <a:endParaRPr lang="it-IT" sz="1400" dirty="0"/>
-          </a:p>
-          <a:p>
-            <a:pPr marL="0" lvl="1"/>
-            <a:r>
-              <a:rPr lang="it-IT" sz="1400" b="1" dirty="0" err="1"/>
-              <a:t>If</a:t>
-            </a:r>
-            <a:r>
-              <a:rPr lang="it-IT" sz="1400" dirty="0"/>
-              <a:t> (ExpCostS2 &gt; 1) </a:t>
-            </a:r>
-            <a:r>
-              <a:rPr lang="it-IT" sz="1400" b="1" dirty="0" err="1"/>
-              <a:t>Then</a:t>
-            </a:r>
-            <a:r>
-              <a:rPr lang="it-IT" sz="1400" dirty="0"/>
-              <a:t> </a:t>
-            </a:r>
-            <a:endParaRPr lang="it-IT" sz="1400" b="1" dirty="0"/>
-          </a:p>
-          <a:p>
-            <a:pPr marL="0" lvl="1"/>
-            <a:r>
-              <a:rPr lang="it-IT" sz="1400" b="1" dirty="0"/>
-              <a:t>Else </a:t>
-            </a:r>
-            <a:r>
-              <a:rPr lang="en-US" sz="1400" dirty="0"/>
-              <a:t>{					</a:t>
-            </a:r>
-            <a:r>
-              <a:rPr lang="it-IT" sz="1400" dirty="0">
-                <a:solidFill>
-                  <a:schemeClr val="accent1"/>
-                </a:solidFill>
-              </a:rPr>
-              <a:t>(I </a:t>
-            </a:r>
-            <a:r>
-              <a:rPr lang="it-IT" sz="1400" dirty="0" err="1">
-                <a:solidFill>
-                  <a:schemeClr val="accent1"/>
-                </a:solidFill>
-              </a:rPr>
-              <a:t>have</a:t>
-            </a:r>
-            <a:r>
-              <a:rPr lang="it-IT" sz="1400" dirty="0">
-                <a:solidFill>
-                  <a:schemeClr val="accent1"/>
-                </a:solidFill>
-              </a:rPr>
-              <a:t> </a:t>
-            </a:r>
-            <a:r>
-              <a:rPr lang="it-IT" sz="1400" dirty="0" err="1">
-                <a:solidFill>
-                  <a:schemeClr val="accent1"/>
-                </a:solidFill>
-              </a:rPr>
-              <a:t>enough</a:t>
-            </a:r>
-            <a:r>
-              <a:rPr lang="it-IT" sz="1400" dirty="0">
-                <a:solidFill>
-                  <a:schemeClr val="accent1"/>
-                </a:solidFill>
-              </a:rPr>
-              <a:t> time to </a:t>
-            </a:r>
-            <a:r>
-              <a:rPr lang="it-IT" sz="1400" dirty="0" err="1">
-                <a:solidFill>
-                  <a:schemeClr val="accent1"/>
-                </a:solidFill>
-              </a:rPr>
-              <a:t>run</a:t>
-            </a:r>
-            <a:r>
-              <a:rPr lang="it-IT" sz="1400" dirty="0">
-                <a:solidFill>
-                  <a:schemeClr val="accent1"/>
-                </a:solidFill>
-              </a:rPr>
-              <a:t> S2)</a:t>
-            </a:r>
-            <a:r>
-              <a:rPr lang="en-US" sz="1400" dirty="0">
-                <a:solidFill>
-                  <a:schemeClr val="accent1"/>
-                </a:solidFill>
-              </a:rPr>
-              <a:t> </a:t>
-            </a:r>
-            <a:endParaRPr lang="it-IT" sz="1400" b="1" dirty="0"/>
-          </a:p>
-          <a:p>
-            <a:pPr lvl="1"/>
-            <a:r>
-              <a:rPr lang="en-US" sz="1400" dirty="0"/>
-              <a:t>with</a:t>
-            </a:r>
-            <a:r>
-              <a:rPr lang="it-IT" sz="1400" dirty="0"/>
-              <a:t> p_s1= (1 - </a:t>
-            </a:r>
-            <a:r>
               <a:rPr lang="it-IT" sz="1400" dirty="0" err="1">
                 <a:solidFill>
                   <a:srgbClr val="FF0000"/>
                 </a:solidFill>
               </a:rPr>
-              <a:t>thresh</a:t>
+              <a:t>select</a:t>
             </a:r>
             <a:r>
               <a:rPr lang="it-IT" sz="1400" dirty="0">
@@ -4466,7 +4414,23 @@
                   <a:srgbClr val="FF0000"/>
                 </a:solidFill>
               </a:rPr>
-              <a:t> 3)*epsilon  -- </a:t>
+              <a:t> </a:t>
+            </a:r>
+            <a:r>
+              <a:rPr lang="it-IT" sz="1400" dirty="0" err="1">
+                <a:solidFill>
+                  <a:srgbClr val="FF0000"/>
+                </a:solidFill>
+              </a:rPr>
+              <a:t>between</a:t>
+            </a:r>
+            <a:r>
+              <a:rPr lang="it-IT" sz="1400" dirty="0">
+                <a:solidFill>
+                  <a:srgbClr val="FF0000"/>
+                </a:solidFill>
+              </a:rPr>
+              <a:t> «</a:t>
             </a:r>
             <a:r>
               <a:rPr lang="it-IT" sz="1400" b="1" u="sng" dirty="0" err="1">
@@ -4482,7 +4446,7 @@
                   <a:srgbClr val="7030A0"/>
                 </a:solidFill>
               </a:rPr>
-              <a:t> S1</a:t>
+              <a:t> S1» or «S2»</a:t>
             </a:r>
             <a:r>
               <a:rPr lang="it-IT" sz="1400" dirty="0"/>
@@ -4520,63 +4484,11 @@
             </a:r>
             <a:r>
               <a:rPr lang="it-IT" sz="1400" dirty="0"/>
-              <a:t> plan P – </a:t>
-            </a:r>
-            <a:r>
-              <a:rPr lang="it-IT" sz="1400" dirty="0">
-                <a:solidFill>
-                  <a:schemeClr val="accent1"/>
-                </a:solidFill>
-              </a:rPr>
-              <a:t>(</a:t>
-            </a:r>
-            <a:r>
-              <a:rPr lang="it-IT" sz="1400" dirty="0" err="1">
-                <a:solidFill>
-                  <a:schemeClr val="accent1"/>
-                </a:solidFill>
-              </a:rPr>
-              <a:t>also</a:t>
-            </a:r>
-            <a:r>
-              <a:rPr lang="it-IT" sz="1400" dirty="0">
-                <a:solidFill>
-                  <a:schemeClr val="accent1"/>
-                </a:solidFill>
-              </a:rPr>
-              <a:t> </a:t>
-            </a:r>
-            <a:r>
-              <a:rPr lang="it-IT" sz="1400" dirty="0" err="1">
-                <a:solidFill>
-                  <a:schemeClr val="accent1"/>
-                </a:solidFill>
-              </a:rPr>
-              <a:t>return</a:t>
-            </a:r>
-            <a:r>
-              <a:rPr lang="it-IT" sz="1400" dirty="0">
-                <a:solidFill>
-                  <a:schemeClr val="accent1"/>
-                </a:solidFill>
-              </a:rPr>
-              <a:t> the «</a:t>
-            </a:r>
-            <a:r>
-              <a:rPr lang="it-IT" sz="1400" dirty="0" err="1">
-                <a:solidFill>
-                  <a:schemeClr val="accent1"/>
-                </a:solidFill>
-              </a:rPr>
-              <a:t>Reward</a:t>
-            </a:r>
-            <a:r>
-              <a:rPr lang="it-IT" sz="1400" dirty="0">
-                <a:solidFill>
-                  <a:schemeClr val="accent1"/>
-                </a:solidFill>
-              </a:rPr>
-              <a:t>(Plan P) »)</a:t>
+              <a:t> plan (P) &gt; minimum </a:t>
+            </a:r>
+            <a:r>
+              <a:rPr lang="it-IT" sz="1400" dirty="0" err="1"/>
+              <a:t>correctness</a:t>
             </a:r>
             <a:r>
               <a:rPr lang="it-IT" sz="1400" dirty="0"/>
@@ -4599,15 +4511,15 @@
             </a:r>
             <a:r>
               <a:rPr lang="it-IT" sz="1400" dirty="0"/>
-              <a:t>  (1 – (Expected_cost_S2 x (1-thres3))) &gt; </a:t>
+              <a:t>  (1 – (ExpCostS2 x (1-thres3))) &gt; </a:t>
             </a:r>
             <a:r>
               <a:rPr lang="it-IT" sz="1400" dirty="0" err="1"/>
-              <a:t>Reward</a:t>
+              <a:t>Verify</a:t>
             </a:r>
             <a:r>
               <a:rPr lang="it-IT" sz="1400" dirty="0"/>
-              <a:t>(Plan P) x (1- </a:t>
+              <a:t> plan (P) x (1- </a:t>
             </a:r>
             <a:r>
               <a:rPr lang="it-IT" sz="1400" dirty="0">
@@ -4661,6 +4573,34 @@
               </a:rPr>
               <a:t>)</a:t>
             </a:r>
+          </a:p>
+          <a:p>
+            <a:pPr lvl="2"/>
+            <a:endParaRPr lang="it-IT" sz="1400" b="1" dirty="0"/>
+          </a:p>
+          <a:p>
+            <a:pPr lvl="2"/>
+            <a:r>
+              <a:rPr lang="it-IT" sz="1400" b="1" dirty="0" err="1"/>
+              <a:t>If</a:t>
+            </a:r>
+            <a:r>
+              <a:rPr lang="it-IT" sz="1400" dirty="0"/>
+              <a:t>  (1/ (</a:t>
+            </a:r>
+            <a:r>
+              <a:rPr lang="it-IT" sz="1400" dirty="0" err="1"/>
+              <a:t>Verify</a:t>
+            </a:r>
+            <a:r>
+              <a:rPr lang="it-IT" sz="1400" dirty="0"/>
+              <a:t> plan (P)) &gt; ExpTimeS2/</a:t>
+            </a:r>
+            <a:endParaRPr lang="it-IT" sz="1400" b="1" dirty="0"/>
+          </a:p>
+          <a:p>
+            <a:pPr lvl="2"/>
+            <a:endParaRPr lang="it-IT" sz="1400" b="1" dirty="0"/>
           </a:p>
           <a:p>
             <a:pPr lvl="2"/>
@@ -5271,8 +5211,8 @@
         </p:nvSpPr>
         <p:spPr>
           <a:xfrm>
-            <a:off x="1858034" y="4018455"/>
-            <a:ext cx="757323" cy="369332"/>
+            <a:off x="1858034" y="3403398"/>
+            <a:ext cx="757323" cy="646331"/>
           </a:xfrm>
           <a:prstGeom prst="rect">
             <a:avLst/>
@@ -5301,6 +5241,13 @@
               </a:rPr>
               <a:t> S1</a:t>
             </a:r>
+            <a:endParaRPr lang="en-US" dirty="0">
+              <a:solidFill>
+                <a:srgbClr val="7030A0"/>
+              </a:solidFill>
+            </a:endParaRPr>
+          </a:p>
+          <a:p>
             <a:endParaRPr lang="en-US" dirty="0">
               <a:solidFill>
                 <a:srgbClr val="7030A0"/>
@@ -5375,8 +5322,8 @@
         </p:nvSpPr>
         <p:spPr>
           <a:xfrm>
-            <a:off x="1016468" y="855128"/>
-            <a:ext cx="3711477" cy="1600438"/>
+            <a:off x="1016467" y="855128"/>
+            <a:ext cx="4339035" cy="1600438"/>
           </a:xfrm>
           <a:prstGeom prst="rect">
             <a:avLst/>
@@ -5473,11 +5420,11 @@
             </a:r>
             <a:r>
               <a:rPr lang="it-IT" sz="1400" dirty="0"/>
-              <a:t>  {</a:t>
+              <a:t>  {(</a:t>
             </a:r>
             <a:r>
               <a:rPr lang="en-US" sz="1400" u="sng" dirty="0"/>
-              <a:t>Adopt S2}</a:t>
+              <a:t>Plan by S2, 1)}</a:t>
             </a:r>
           </a:p>
           <a:p>
@@ -5527,7 +5474,7 @@
         <p:spPr>
           <a:xfrm>
             <a:off x="1402254" y="817911"/>
-            <a:ext cx="3161861" cy="1493398"/>
+            <a:ext cx="3590370" cy="1493398"/>
           </a:xfrm>
           <a:prstGeom prst="rect">
             <a:avLst/>

</xml_diff>